<commit_message>
modify pptx and add learning goals slide.
</commit_message>
<xml_diff>
--- a/mysql-in-action-presentation.pptx
+++ b/mysql-in-action-presentation.pptx
@@ -2970,14 +2970,20 @@
       <p:bgPr>
         <a:gradFill>
           <a:gsLst>
-            <a:gs pos="55000">
-              <a:srgbClr val="1181AE"/>
+            <a:gs pos="53000">
+              <a:schemeClr val="accent6">
+                <a:lumMod val="100000"/>
+              </a:schemeClr>
             </a:gs>
             <a:gs pos="0">
-              <a:srgbClr val="1181AE"/>
+              <a:schemeClr val="accent6">
+                <a:lumMod val="75000"/>
+              </a:schemeClr>
             </a:gs>
             <a:gs pos="100000">
-              <a:srgbClr val="095474"/>
+              <a:schemeClr val="accent6">
+                <a:lumMod val="75000"/>
+              </a:schemeClr>
             </a:gs>
           </a:gsLst>
           <a:path path="circle">
@@ -3009,8 +3015,8 @@
         </p:nvSpPr>
         <p:spPr>
           <a:xfrm>
-            <a:off x="5192592" y="3294330"/>
-            <a:ext cx="1797288" cy="1569660"/>
+            <a:off x="5170952" y="3294330"/>
+            <a:ext cx="1840568" cy="1569660"/>
           </a:xfrm>
           <a:prstGeom prst="rect">
             <a:avLst/>
@@ -3025,17 +3031,17 @@
           <a:p>
             <a:pPr algn="ctr"/>
             <a:r>
-              <a:rPr lang="en-PH" sz="4800" dirty="0">
+              <a:rPr lang="en-PH" sz="4800" b="1" dirty="0">
                 <a:solidFill>
-                  <a:schemeClr val="bg1"/>
+                  <a:srgbClr val="005F8B"/>
                 </a:solidFill>
               </a:rPr>
               <a:t>i</a:t>
             </a:r>
             <a:r>
-              <a:rPr lang="en-PH" sz="4800" dirty="0" smtClean="0">
+              <a:rPr lang="en-PH" sz="4800" b="1" dirty="0" smtClean="0">
                 <a:solidFill>
-                  <a:schemeClr val="bg1"/>
+                  <a:srgbClr val="005F8B"/>
                 </a:solidFill>
               </a:rPr>
               <a:t>n</a:t>
@@ -3044,16 +3050,16 @@
           <a:p>
             <a:pPr algn="ctr"/>
             <a:r>
-              <a:rPr lang="en-PH" sz="4800" dirty="0" smtClean="0">
+              <a:rPr lang="en-PH" sz="4800" b="1" dirty="0" smtClean="0">
                 <a:solidFill>
-                  <a:schemeClr val="bg1"/>
+                  <a:srgbClr val="005F8B"/>
                 </a:solidFill>
               </a:rPr>
               <a:t>Action</a:t>
             </a:r>
-            <a:endParaRPr lang="en-PH" sz="4800" dirty="0">
+            <a:endParaRPr lang="en-PH" sz="4800" b="1" dirty="0">
               <a:solidFill>
-                <a:schemeClr val="bg1"/>
+                <a:srgbClr val="005F8B"/>
               </a:solidFill>
             </a:endParaRPr>
           </a:p>
@@ -3124,14 +3130,21 @@
       <p:bgPr>
         <a:gradFill>
           <a:gsLst>
-            <a:gs pos="55000">
-              <a:srgbClr val="1181AE"/>
+            <a:gs pos="53000">
+              <a:schemeClr val="accent6">
+                <a:lumMod val="99000"/>
+                <a:lumOff val="1000"/>
+              </a:schemeClr>
             </a:gs>
             <a:gs pos="0">
-              <a:srgbClr val="1181AE"/>
+              <a:schemeClr val="accent6">
+                <a:lumMod val="75000"/>
+              </a:schemeClr>
             </a:gs>
             <a:gs pos="100000">
-              <a:srgbClr val="095474"/>
+              <a:schemeClr val="accent6">
+                <a:lumMod val="75000"/>
+              </a:schemeClr>
             </a:gs>
           </a:gsLst>
           <a:path path="circle">
@@ -3155,10 +3168,401 @@
           <a:chExt cx="0" cy="0"/>
         </a:xfrm>
       </p:grpSpPr>
+      <p:pic>
+        <p:nvPicPr>
+          <p:cNvPr id="3" name="Picture 2"/>
+          <p:cNvPicPr>
+            <a:picLocks noChangeAspect="1"/>
+          </p:cNvPicPr>
+          <p:nvPr/>
+        </p:nvPicPr>
+        <p:blipFill>
+          <a:blip r:embed="rId2">
+            <a:extLst>
+              <a:ext uri="{28A0092B-C50C-407E-A947-70E740481C1C}">
+                <a14:useLocalDpi xmlns:a14="http://schemas.microsoft.com/office/drawing/2010/main" val="0"/>
+              </a:ext>
+            </a:extLst>
+          </a:blip>
+          <a:stretch>
+            <a:fillRect/>
+          </a:stretch>
+        </p:blipFill>
+        <p:spPr>
+          <a:xfrm>
+            <a:off x="10705752" y="160867"/>
+            <a:ext cx="1294688" cy="668867"/>
+          </a:xfrm>
+          <a:prstGeom prst="rect">
+            <a:avLst/>
+          </a:prstGeom>
+        </p:spPr>
+      </p:pic>
+      <p:sp>
+        <p:nvSpPr>
+          <p:cNvPr id="4" name="TextBox 3"/>
+          <p:cNvSpPr txBox="1"/>
+          <p:nvPr/>
+        </p:nvSpPr>
+        <p:spPr>
+          <a:xfrm>
+            <a:off x="207304" y="160867"/>
+            <a:ext cx="3943708" cy="830997"/>
+          </a:xfrm>
+          <a:prstGeom prst="rect">
+            <a:avLst/>
+          </a:prstGeom>
+          <a:noFill/>
+        </p:spPr>
+        <p:txBody>
+          <a:bodyPr wrap="none" rtlCol="0">
+            <a:spAutoFit/>
+          </a:bodyPr>
+          <a:lstStyle/>
+          <a:p>
+            <a:r>
+              <a:rPr lang="en-PH" sz="4800" b="1" dirty="0" smtClean="0">
+                <a:solidFill>
+                  <a:schemeClr val="bg1"/>
+                </a:solidFill>
+              </a:rPr>
+              <a:t>Learning Goals</a:t>
+            </a:r>
+            <a:endParaRPr lang="en-PH" sz="4800" b="1" dirty="0">
+              <a:solidFill>
+                <a:schemeClr val="bg1"/>
+              </a:solidFill>
+            </a:endParaRPr>
+          </a:p>
+        </p:txBody>
+      </p:sp>
+      <p:sp>
+        <p:nvSpPr>
+          <p:cNvPr id="5" name="TextBox 4"/>
+          <p:cNvSpPr txBox="1"/>
+          <p:nvPr/>
+        </p:nvSpPr>
+        <p:spPr>
+          <a:xfrm>
+            <a:off x="395220" y="1670012"/>
+            <a:ext cx="8105313" cy="4401205"/>
+          </a:xfrm>
+          <a:prstGeom prst="rect">
+            <a:avLst/>
+          </a:prstGeom>
+          <a:noFill/>
+        </p:spPr>
+        <p:txBody>
+          <a:bodyPr wrap="square" rtlCol="0">
+            <a:spAutoFit/>
+          </a:bodyPr>
+          <a:lstStyle/>
+          <a:p>
+            <a:pPr marL="457200" indent="-457200">
+              <a:buFont typeface="Wingdings" charset="2"/>
+              <a:buChar char="v"/>
+            </a:pPr>
+            <a:r>
+              <a:rPr lang="en-PH" sz="2800" b="1" dirty="0" smtClean="0">
+                <a:solidFill>
+                  <a:schemeClr val="bg1"/>
+                </a:solidFill>
+              </a:rPr>
+              <a:t>Create Database (syntax, character set, collation).</a:t>
+            </a:r>
+          </a:p>
+          <a:p>
+            <a:pPr marL="457200" indent="-457200">
+              <a:buFont typeface="Wingdings" charset="2"/>
+              <a:buChar char="v"/>
+            </a:pPr>
+            <a:r>
+              <a:rPr lang="en-PH" sz="2800" b="1" dirty="0" smtClean="0">
+                <a:solidFill>
+                  <a:schemeClr val="bg1"/>
+                </a:solidFill>
+              </a:rPr>
+              <a:t>Create Table (syntax, storage engine).</a:t>
+            </a:r>
+          </a:p>
+          <a:p>
+            <a:pPr marL="457200" indent="-457200">
+              <a:buFont typeface="Wingdings" charset="2"/>
+              <a:buChar char="v"/>
+            </a:pPr>
+            <a:r>
+              <a:rPr lang="en-PH" sz="2800" b="1" dirty="0" smtClean="0">
+                <a:solidFill>
+                  <a:schemeClr val="bg1"/>
+                </a:solidFill>
+              </a:rPr>
+              <a:t>Derived Table</a:t>
+            </a:r>
+            <a:endParaRPr lang="en-PH" sz="2800" b="1" dirty="0">
+              <a:solidFill>
+                <a:schemeClr val="bg1"/>
+              </a:solidFill>
+            </a:endParaRPr>
+          </a:p>
+          <a:p>
+            <a:pPr marL="457200" indent="-457200">
+              <a:buFont typeface="Wingdings" charset="2"/>
+              <a:buChar char="v"/>
+            </a:pPr>
+            <a:r>
+              <a:rPr lang="en-PH" sz="2800" b="1" dirty="0" smtClean="0">
+                <a:solidFill>
+                  <a:schemeClr val="bg1"/>
+                </a:solidFill>
+              </a:rPr>
+              <a:t>Sub Query</a:t>
+            </a:r>
+          </a:p>
+          <a:p>
+            <a:pPr marL="457200" indent="-457200">
+              <a:buFont typeface="Wingdings" charset="2"/>
+              <a:buChar char="v"/>
+            </a:pPr>
+            <a:r>
+              <a:rPr lang="en-PH" sz="2800" b="1" dirty="0" smtClean="0">
+                <a:solidFill>
+                  <a:schemeClr val="bg1"/>
+                </a:solidFill>
+              </a:rPr>
+              <a:t>Triggers</a:t>
+            </a:r>
+          </a:p>
+          <a:p>
+            <a:pPr marL="457200" indent="-457200">
+              <a:buFont typeface="Wingdings" charset="2"/>
+              <a:buChar char="v"/>
+            </a:pPr>
+            <a:r>
+              <a:rPr lang="en-PH" sz="2800" b="1" dirty="0" smtClean="0">
+                <a:solidFill>
+                  <a:schemeClr val="bg1"/>
+                </a:solidFill>
+              </a:rPr>
+              <a:t>Views</a:t>
+            </a:r>
+          </a:p>
+          <a:p>
+            <a:pPr marL="457200" indent="-457200">
+              <a:buFont typeface="Wingdings" charset="2"/>
+              <a:buChar char="v"/>
+            </a:pPr>
+            <a:r>
+              <a:rPr lang="en-PH" sz="2800" b="1" dirty="0" smtClean="0">
+                <a:solidFill>
+                  <a:schemeClr val="bg1"/>
+                </a:solidFill>
+              </a:rPr>
+              <a:t>Stored Function</a:t>
+            </a:r>
+          </a:p>
+          <a:p>
+            <a:pPr marL="457200" indent="-457200">
+              <a:buFont typeface="Wingdings" charset="2"/>
+              <a:buChar char="v"/>
+            </a:pPr>
+            <a:r>
+              <a:rPr lang="en-PH" sz="2800" b="1" dirty="0" smtClean="0">
+                <a:solidFill>
+                  <a:schemeClr val="bg1"/>
+                </a:solidFill>
+              </a:rPr>
+              <a:t>Stored Procedures</a:t>
+            </a:r>
+          </a:p>
+          <a:p>
+            <a:pPr marL="457200" indent="-457200">
+              <a:buFont typeface="Wingdings" charset="2"/>
+              <a:buChar char="v"/>
+            </a:pPr>
+            <a:r>
+              <a:rPr lang="en-PH" sz="2800" b="1" dirty="0" smtClean="0">
+                <a:solidFill>
+                  <a:schemeClr val="bg1"/>
+                </a:solidFill>
+              </a:rPr>
+              <a:t>Temporary Table </a:t>
+            </a:r>
+          </a:p>
+          <a:p>
+            <a:pPr marL="457200" indent="-457200">
+              <a:buFont typeface="Wingdings" charset="2"/>
+              <a:buChar char="v"/>
+            </a:pPr>
+            <a:r>
+              <a:rPr lang="en-PH" sz="2800" b="1" dirty="0" smtClean="0">
+                <a:solidFill>
+                  <a:schemeClr val="bg1"/>
+                </a:solidFill>
+              </a:rPr>
+              <a:t>Transactions</a:t>
+            </a:r>
+            <a:endParaRPr lang="en-PH" sz="2800" b="1" dirty="0">
+              <a:solidFill>
+                <a:schemeClr val="bg1"/>
+              </a:solidFill>
+            </a:endParaRPr>
+          </a:p>
+        </p:txBody>
+      </p:sp>
+      <p:sp>
+        <p:nvSpPr>
+          <p:cNvPr id="7" name="TextBox 6"/>
+          <p:cNvSpPr txBox="1"/>
+          <p:nvPr/>
+        </p:nvSpPr>
+        <p:spPr>
+          <a:xfrm>
+            <a:off x="207304" y="1069328"/>
+            <a:ext cx="5108113" cy="523220"/>
+          </a:xfrm>
+          <a:prstGeom prst="rect">
+            <a:avLst/>
+          </a:prstGeom>
+          <a:noFill/>
+        </p:spPr>
+        <p:txBody>
+          <a:bodyPr wrap="square" rtlCol="0">
+            <a:spAutoFit/>
+          </a:bodyPr>
+          <a:lstStyle/>
+          <a:p>
+            <a:r>
+              <a:rPr lang="en-PH" sz="2800" b="1" dirty="0" smtClean="0">
+                <a:solidFill>
+                  <a:schemeClr val="bg1"/>
+                </a:solidFill>
+              </a:rPr>
+              <a:t>Lectures</a:t>
+            </a:r>
+            <a:endParaRPr lang="en-PH" sz="2800" b="1" dirty="0">
+              <a:solidFill>
+                <a:schemeClr val="bg1"/>
+              </a:solidFill>
+            </a:endParaRPr>
+          </a:p>
+        </p:txBody>
+      </p:sp>
+      <p:sp>
+        <p:nvSpPr>
+          <p:cNvPr id="8" name="TextBox 7"/>
+          <p:cNvSpPr txBox="1"/>
+          <p:nvPr/>
+        </p:nvSpPr>
+        <p:spPr>
+          <a:xfrm>
+            <a:off x="5672668" y="3244081"/>
+            <a:ext cx="6094350" cy="954107"/>
+          </a:xfrm>
+          <a:prstGeom prst="rect">
+            <a:avLst/>
+          </a:prstGeom>
+          <a:noFill/>
+        </p:spPr>
+        <p:txBody>
+          <a:bodyPr wrap="square" rtlCol="0">
+            <a:spAutoFit/>
+          </a:bodyPr>
+          <a:lstStyle/>
+          <a:p>
+            <a:r>
+              <a:rPr lang="en-PH" sz="2800" b="1" dirty="0" smtClean="0">
+                <a:solidFill>
+                  <a:schemeClr val="bg1"/>
+                </a:solidFill>
+              </a:rPr>
+              <a:t>Code Demo </a:t>
+            </a:r>
+          </a:p>
+          <a:p>
+            <a:pPr marL="457200" indent="-457200">
+              <a:buFont typeface="Wingdings" charset="2"/>
+              <a:buChar char="v"/>
+            </a:pPr>
+            <a:r>
+              <a:rPr lang="en-PH" sz="2800" b="1" dirty="0" err="1" smtClean="0">
+                <a:solidFill>
+                  <a:schemeClr val="bg1"/>
+                </a:solidFill>
+              </a:rPr>
+              <a:t>eLoading</a:t>
+            </a:r>
+            <a:r>
+              <a:rPr lang="en-PH" sz="2800" b="1" dirty="0" smtClean="0">
+                <a:solidFill>
+                  <a:schemeClr val="bg1"/>
+                </a:solidFill>
+              </a:rPr>
+              <a:t> Backend App</a:t>
+            </a:r>
+            <a:endParaRPr lang="en-PH" sz="2800" b="1" dirty="0">
+              <a:solidFill>
+                <a:schemeClr val="bg1"/>
+              </a:solidFill>
+            </a:endParaRPr>
+          </a:p>
+        </p:txBody>
+      </p:sp>
+      <p:sp>
+        <p:nvSpPr>
+          <p:cNvPr id="9" name="TextBox 8"/>
+          <p:cNvSpPr txBox="1"/>
+          <p:nvPr/>
+        </p:nvSpPr>
+        <p:spPr>
+          <a:xfrm>
+            <a:off x="5672668" y="4513715"/>
+            <a:ext cx="6094350" cy="1384995"/>
+          </a:xfrm>
+          <a:prstGeom prst="rect">
+            <a:avLst/>
+          </a:prstGeom>
+          <a:noFill/>
+        </p:spPr>
+        <p:txBody>
+          <a:bodyPr wrap="square" rtlCol="0">
+            <a:spAutoFit/>
+          </a:bodyPr>
+          <a:lstStyle/>
+          <a:p>
+            <a:r>
+              <a:rPr lang="en-PH" sz="2800" b="1" dirty="0" smtClean="0">
+                <a:solidFill>
+                  <a:schemeClr val="bg1"/>
+                </a:solidFill>
+              </a:rPr>
+              <a:t>Use Cases</a:t>
+            </a:r>
+          </a:p>
+          <a:p>
+            <a:pPr marL="457200" indent="-457200">
+              <a:buFont typeface="Wingdings" charset="2"/>
+              <a:buChar char="v"/>
+            </a:pPr>
+            <a:r>
+              <a:rPr lang="en-PH" sz="2800" b="1" dirty="0" smtClean="0">
+                <a:solidFill>
+                  <a:schemeClr val="bg1"/>
+                </a:solidFill>
+              </a:rPr>
+              <a:t>11 actual transactions from the Code Demo.</a:t>
+            </a:r>
+            <a:endParaRPr lang="en-PH" sz="2800" b="1" dirty="0">
+              <a:solidFill>
+                <a:schemeClr val="bg1"/>
+              </a:solidFill>
+            </a:endParaRPr>
+          </a:p>
+        </p:txBody>
+      </p:sp>
     </p:spTree>
     <p:extLst>
       <p:ext uri="{BB962C8B-B14F-4D97-AF65-F5344CB8AC3E}">
-        <p14:creationId xmlns:p14="http://schemas.microsoft.com/office/powerpoint/2010/main" val="2327268253"/>
+        <p14:creationId xmlns:p14="http://schemas.microsoft.com/office/powerpoint/2010/main" val="1362496806"/>
       </p:ext>
     </p:extLst>
   </p:cSld>

</xml_diff>